<commit_message>
Se modifica la distribución agregando la estación de pulido
</commit_message>
<xml_diff>
--- a/Proyecto 70%/DiagramaDeFlujoyDistribuciónPlantas.pptx
+++ b/Proyecto 70%/DiagramaDeFlujoyDistribuciónPlantas.pptx
@@ -262,7 +262,7 @@
           <a:p>
             <a:fld id="{AC99F317-4046-4020-BB69-9CFE970CA418}" type="datetimeFigureOut">
               <a:rPr lang="en-US" smtClean="0"/>
-              <a:t>10/11/2023</a:t>
+              <a:t>10/12/2023</a:t>
             </a:fld>
             <a:endParaRPr lang="en-US" dirty="0"/>
           </a:p>
@@ -462,7 +462,7 @@
           <a:p>
             <a:fld id="{AC99F317-4046-4020-BB69-9CFE970CA418}" type="datetimeFigureOut">
               <a:rPr lang="en-US" smtClean="0"/>
-              <a:t>10/11/2023</a:t>
+              <a:t>10/12/2023</a:t>
             </a:fld>
             <a:endParaRPr lang="en-US" dirty="0"/>
           </a:p>
@@ -672,7 +672,7 @@
           <a:p>
             <a:fld id="{AC99F317-4046-4020-BB69-9CFE970CA418}" type="datetimeFigureOut">
               <a:rPr lang="en-US" smtClean="0"/>
-              <a:t>10/11/2023</a:t>
+              <a:t>10/12/2023</a:t>
             </a:fld>
             <a:endParaRPr lang="en-US" dirty="0"/>
           </a:p>
@@ -872,7 +872,7 @@
           <a:p>
             <a:fld id="{AC99F317-4046-4020-BB69-9CFE970CA418}" type="datetimeFigureOut">
               <a:rPr lang="en-US" smtClean="0"/>
-              <a:t>10/11/2023</a:t>
+              <a:t>10/12/2023</a:t>
             </a:fld>
             <a:endParaRPr lang="en-US" dirty="0"/>
           </a:p>
@@ -1148,7 +1148,7 @@
           <a:p>
             <a:fld id="{AC99F317-4046-4020-BB69-9CFE970CA418}" type="datetimeFigureOut">
               <a:rPr lang="en-US" smtClean="0"/>
-              <a:t>10/11/2023</a:t>
+              <a:t>10/12/2023</a:t>
             </a:fld>
             <a:endParaRPr lang="en-US" dirty="0"/>
           </a:p>
@@ -1416,7 +1416,7 @@
           <a:p>
             <a:fld id="{AC99F317-4046-4020-BB69-9CFE970CA418}" type="datetimeFigureOut">
               <a:rPr lang="en-US" smtClean="0"/>
-              <a:t>10/11/2023</a:t>
+              <a:t>10/12/2023</a:t>
             </a:fld>
             <a:endParaRPr lang="en-US" dirty="0"/>
           </a:p>
@@ -1831,7 +1831,7 @@
           <a:p>
             <a:fld id="{AC99F317-4046-4020-BB69-9CFE970CA418}" type="datetimeFigureOut">
               <a:rPr lang="en-US" smtClean="0"/>
-              <a:t>10/11/2023</a:t>
+              <a:t>10/12/2023</a:t>
             </a:fld>
             <a:endParaRPr lang="en-US" dirty="0"/>
           </a:p>
@@ -1973,7 +1973,7 @@
           <a:p>
             <a:fld id="{AC99F317-4046-4020-BB69-9CFE970CA418}" type="datetimeFigureOut">
               <a:rPr lang="en-US" smtClean="0"/>
-              <a:t>10/11/2023</a:t>
+              <a:t>10/12/2023</a:t>
             </a:fld>
             <a:endParaRPr lang="en-US" dirty="0"/>
           </a:p>
@@ -2086,7 +2086,7 @@
           <a:p>
             <a:fld id="{AC99F317-4046-4020-BB69-9CFE970CA418}" type="datetimeFigureOut">
               <a:rPr lang="en-US" smtClean="0"/>
-              <a:t>10/11/2023</a:t>
+              <a:t>10/12/2023</a:t>
             </a:fld>
             <a:endParaRPr lang="en-US" dirty="0"/>
           </a:p>
@@ -2399,7 +2399,7 @@
           <a:p>
             <a:fld id="{AC99F317-4046-4020-BB69-9CFE970CA418}" type="datetimeFigureOut">
               <a:rPr lang="en-US" smtClean="0"/>
-              <a:t>10/11/2023</a:t>
+              <a:t>10/12/2023</a:t>
             </a:fld>
             <a:endParaRPr lang="en-US" dirty="0"/>
           </a:p>
@@ -2688,7 +2688,7 @@
           <a:p>
             <a:fld id="{AC99F317-4046-4020-BB69-9CFE970CA418}" type="datetimeFigureOut">
               <a:rPr lang="en-US" smtClean="0"/>
-              <a:t>10/11/2023</a:t>
+              <a:t>10/12/2023</a:t>
             </a:fld>
             <a:endParaRPr lang="en-US" dirty="0"/>
           </a:p>
@@ -2931,7 +2931,7 @@
           <a:p>
             <a:fld id="{AC99F317-4046-4020-BB69-9CFE970CA418}" type="datetimeFigureOut">
               <a:rPr lang="en-US" smtClean="0"/>
-              <a:t>10/11/2023</a:t>
+              <a:t>10/12/2023</a:t>
             </a:fld>
             <a:endParaRPr lang="en-US" dirty="0"/>
           </a:p>
@@ -4743,8 +4743,8 @@
         </p:nvSpPr>
         <p:spPr>
           <a:xfrm>
-            <a:off x="8494592" y="2116882"/>
-            <a:ext cx="1981200" cy="1087537"/>
+            <a:off x="8469512" y="1265740"/>
+            <a:ext cx="1981200" cy="942975"/>
           </a:xfrm>
           <a:prstGeom prst="rect">
             <a:avLst/>
@@ -5230,6 +5230,7 @@
             </a:extLst>
           </p:cNvPr>
           <p:cNvCxnSpPr>
+            <a:cxnSpLocks/>
             <a:stCxn id="6" idx="3"/>
             <a:endCxn id="5" idx="1"/>
           </p:cNvCxnSpPr>
@@ -5237,49 +5238,8 @@
         </p:nvCxnSpPr>
         <p:spPr>
           <a:xfrm flipV="1">
-            <a:off x="8041137" y="2660651"/>
-            <a:ext cx="453455" cy="471488"/>
-          </a:xfrm>
-          <a:prstGeom prst="bentConnector3">
-            <a:avLst/>
-          </a:prstGeom>
-          <a:ln>
-            <a:tailEnd type="triangle"/>
-          </a:ln>
-        </p:spPr>
-        <p:style>
-          <a:lnRef idx="1">
-            <a:schemeClr val="accent1"/>
-          </a:lnRef>
-          <a:fillRef idx="0">
-            <a:schemeClr val="accent1"/>
-          </a:fillRef>
-          <a:effectRef idx="0">
-            <a:schemeClr val="accent1"/>
-          </a:effectRef>
-          <a:fontRef idx="minor">
-            <a:schemeClr val="tx1"/>
-          </a:fontRef>
-        </p:style>
-      </p:cxnSp>
-      <p:cxnSp>
-        <p:nvCxnSpPr>
-          <p:cNvPr id="39" name="Conector: angular 38">
-            <a:extLst>
-              <a:ext uri="{FF2B5EF4-FFF2-40B4-BE49-F238E27FC236}">
-                <a16:creationId xmlns:a16="http://schemas.microsoft.com/office/drawing/2014/main" id="{A462B59D-A665-F2B6-9CD5-D539A8D26F2C}"/>
-              </a:ext>
-            </a:extLst>
-          </p:cNvPr>
-          <p:cNvCxnSpPr>
-            <a:stCxn id="5" idx="2"/>
-          </p:cNvCxnSpPr>
-          <p:nvPr/>
-        </p:nvCxnSpPr>
-        <p:spPr>
-          <a:xfrm rot="16200000" flipH="1">
-            <a:off x="9483256" y="3206355"/>
-            <a:ext cx="493105" cy="489232"/>
+            <a:off x="8041137" y="1737228"/>
+            <a:ext cx="428375" cy="1394911"/>
           </a:xfrm>
           <a:prstGeom prst="bentConnector3">
             <a:avLst/>
@@ -5443,6 +5403,136 @@
           <a:xfrm flipH="1">
             <a:off x="3397219" y="3155329"/>
             <a:ext cx="437471" cy="0"/>
+          </a:xfrm>
+          <a:prstGeom prst="straightConnector1">
+            <a:avLst/>
+          </a:prstGeom>
+          <a:ln>
+            <a:tailEnd type="triangle"/>
+          </a:ln>
+        </p:spPr>
+        <p:style>
+          <a:lnRef idx="1">
+            <a:schemeClr val="accent1"/>
+          </a:lnRef>
+          <a:fillRef idx="0">
+            <a:schemeClr val="accent1"/>
+          </a:fillRef>
+          <a:effectRef idx="0">
+            <a:schemeClr val="accent1"/>
+          </a:effectRef>
+          <a:fontRef idx="minor">
+            <a:schemeClr val="tx1"/>
+          </a:fontRef>
+        </p:style>
+      </p:cxnSp>
+      <p:sp>
+        <p:nvSpPr>
+          <p:cNvPr id="7" name="Rectángulo 6">
+            <a:extLst>
+              <a:ext uri="{FF2B5EF4-FFF2-40B4-BE49-F238E27FC236}">
+                <a16:creationId xmlns:a16="http://schemas.microsoft.com/office/drawing/2014/main" id="{624CE497-3291-D1FF-A241-417C2C336EE0}"/>
+              </a:ext>
+            </a:extLst>
+          </p:cNvPr>
+          <p:cNvSpPr/>
+          <p:nvPr/>
+        </p:nvSpPr>
+        <p:spPr>
+          <a:xfrm>
+            <a:off x="8469512" y="2549551"/>
+            <a:ext cx="1981200" cy="879449"/>
+          </a:xfrm>
+          <a:prstGeom prst="rect">
+            <a:avLst/>
+          </a:prstGeom>
+        </p:spPr>
+        <p:style>
+          <a:lnRef idx="2">
+            <a:schemeClr val="accent6"/>
+          </a:lnRef>
+          <a:fillRef idx="1">
+            <a:schemeClr val="lt1"/>
+          </a:fillRef>
+          <a:effectRef idx="0">
+            <a:schemeClr val="accent6"/>
+          </a:effectRef>
+          <a:fontRef idx="minor">
+            <a:schemeClr val="dk1"/>
+          </a:fontRef>
+        </p:style>
+        <p:txBody>
+          <a:bodyPr rtlCol="0" anchor="ctr"/>
+          <a:lstStyle/>
+          <a:p>
+            <a:pPr algn="ctr"/>
+            <a:r>
+              <a:rPr lang="es-419" dirty="0"/>
+              <a:t>Pulido</a:t>
+            </a:r>
+          </a:p>
+        </p:txBody>
+      </p:sp>
+      <p:cxnSp>
+        <p:nvCxnSpPr>
+          <p:cNvPr id="18" name="Conector recto de flecha 17">
+            <a:extLst>
+              <a:ext uri="{FF2B5EF4-FFF2-40B4-BE49-F238E27FC236}">
+                <a16:creationId xmlns:a16="http://schemas.microsoft.com/office/drawing/2014/main" id="{86772C2F-5A17-ED56-5753-3DB094C9F219}"/>
+              </a:ext>
+            </a:extLst>
+          </p:cNvPr>
+          <p:cNvCxnSpPr>
+            <a:stCxn id="5" idx="2"/>
+            <a:endCxn id="7" idx="0"/>
+          </p:cNvCxnSpPr>
+          <p:nvPr/>
+        </p:nvCxnSpPr>
+        <p:spPr>
+          <a:xfrm>
+            <a:off x="9460112" y="2208715"/>
+            <a:ext cx="0" cy="340836"/>
+          </a:xfrm>
+          <a:prstGeom prst="straightConnector1">
+            <a:avLst/>
+          </a:prstGeom>
+          <a:ln>
+            <a:tailEnd type="triangle"/>
+          </a:ln>
+        </p:spPr>
+        <p:style>
+          <a:lnRef idx="1">
+            <a:schemeClr val="accent1"/>
+          </a:lnRef>
+          <a:fillRef idx="0">
+            <a:schemeClr val="accent1"/>
+          </a:fillRef>
+          <a:effectRef idx="0">
+            <a:schemeClr val="accent1"/>
+          </a:effectRef>
+          <a:fontRef idx="minor">
+            <a:schemeClr val="tx1"/>
+          </a:fontRef>
+        </p:style>
+      </p:cxnSp>
+      <p:cxnSp>
+        <p:nvCxnSpPr>
+          <p:cNvPr id="22" name="Conector recto de flecha 21">
+            <a:extLst>
+              <a:ext uri="{FF2B5EF4-FFF2-40B4-BE49-F238E27FC236}">
+                <a16:creationId xmlns:a16="http://schemas.microsoft.com/office/drawing/2014/main" id="{8B6F8701-856F-401B-FB47-5BA5A58A908D}"/>
+              </a:ext>
+            </a:extLst>
+          </p:cNvPr>
+          <p:cNvCxnSpPr>
+            <a:cxnSpLocks/>
+          </p:cNvCxnSpPr>
+          <p:nvPr/>
+        </p:nvCxnSpPr>
+        <p:spPr>
+          <a:xfrm>
+            <a:off x="9460112" y="3429000"/>
+            <a:ext cx="0" cy="268524"/>
           </a:xfrm>
           <a:prstGeom prst="straightConnector1">
             <a:avLst/>

</xml_diff>